<commit_message>
The person responsible for the K8s cluster has been added
</commit_message>
<xml_diff>
--- a/PracticeTasks/Module2/Task_9.1/Task 9.1 Resources and microservices.pptx
+++ b/PracticeTasks/Module2/Task_9.1/Task 9.1 Resources and microservices.pptx
@@ -7067,6 +7067,298 @@
               <a:t>Resources and microservices</a:t>
             </a:r>
             <a:endParaRPr/>
+          </a:p>
+        </p:txBody>
+      </p:sp>
+      <p:sp>
+        <p:nvSpPr>
+          <p:cNvPr id="4" name="TextBox 1">
+            <a:extLst>
+              <a:ext uri="{FF2B5EF4-FFF2-40B4-BE49-F238E27FC236}">
+                <a16:creationId xmlns:a16="http://schemas.microsoft.com/office/drawing/2014/main" id="{BCD20AAA-E16B-F51D-BF7C-5D00007D96DF}"/>
+              </a:ext>
+            </a:extLst>
+          </p:cNvPr>
+          <p:cNvSpPr txBox="1"/>
+          <p:nvPr/>
+        </p:nvSpPr>
+        <p:spPr>
+          <a:xfrm>
+            <a:off x="5957795" y="4613862"/>
+            <a:ext cx="2874505" cy="307777"/>
+          </a:xfrm>
+          <a:prstGeom prst="rect">
+            <a:avLst/>
+          </a:prstGeom>
+          <a:noFill/>
+        </p:spPr>
+        <p:txBody>
+          <a:bodyPr wrap="none" rtlCol="0">
+            <a:spAutoFit/>
+          </a:bodyPr>
+          <a:lstStyle>
+            <a:defPPr marR="0" lvl="0" algn="l" rtl="0">
+              <a:lnSpc>
+                <a:spcPct val="100000"/>
+              </a:lnSpc>
+              <a:spcBef>
+                <a:spcPts val="0"/>
+              </a:spcBef>
+              <a:spcAft>
+                <a:spcPts val="0"/>
+              </a:spcAft>
+            </a:defPPr>
+            <a:lvl1pPr marR="0" lvl="0" algn="l" rtl="0">
+              <a:lnSpc>
+                <a:spcPct val="100000"/>
+              </a:lnSpc>
+              <a:spcBef>
+                <a:spcPts val="0"/>
+              </a:spcBef>
+              <a:spcAft>
+                <a:spcPts val="0"/>
+              </a:spcAft>
+              <a:buClr>
+                <a:srgbClr val="000000"/>
+              </a:buClr>
+              <a:buFont typeface="Arial"/>
+              <a:defRPr sz="1400" b="0" i="0" u="none" strike="noStrike" cap="none">
+                <a:solidFill>
+                  <a:srgbClr val="000000"/>
+                </a:solidFill>
+                <a:latin typeface="Arial"/>
+                <a:ea typeface="Arial"/>
+                <a:cs typeface="Arial"/>
+                <a:sym typeface="Arial"/>
+              </a:defRPr>
+            </a:lvl1pPr>
+            <a:lvl2pPr marR="0" lvl="1" algn="l" rtl="0">
+              <a:lnSpc>
+                <a:spcPct val="100000"/>
+              </a:lnSpc>
+              <a:spcBef>
+                <a:spcPts val="0"/>
+              </a:spcBef>
+              <a:spcAft>
+                <a:spcPts val="0"/>
+              </a:spcAft>
+              <a:buClr>
+                <a:srgbClr val="000000"/>
+              </a:buClr>
+              <a:buFont typeface="Arial"/>
+              <a:defRPr sz="1400" b="0" i="0" u="none" strike="noStrike" cap="none">
+                <a:solidFill>
+                  <a:srgbClr val="000000"/>
+                </a:solidFill>
+                <a:latin typeface="Arial"/>
+                <a:ea typeface="Arial"/>
+                <a:cs typeface="Arial"/>
+                <a:sym typeface="Arial"/>
+              </a:defRPr>
+            </a:lvl2pPr>
+            <a:lvl3pPr marR="0" lvl="2" algn="l" rtl="0">
+              <a:lnSpc>
+                <a:spcPct val="100000"/>
+              </a:lnSpc>
+              <a:spcBef>
+                <a:spcPts val="0"/>
+              </a:spcBef>
+              <a:spcAft>
+                <a:spcPts val="0"/>
+              </a:spcAft>
+              <a:buClr>
+                <a:srgbClr val="000000"/>
+              </a:buClr>
+              <a:buFont typeface="Arial"/>
+              <a:defRPr sz="1400" b="0" i="0" u="none" strike="noStrike" cap="none">
+                <a:solidFill>
+                  <a:srgbClr val="000000"/>
+                </a:solidFill>
+                <a:latin typeface="Arial"/>
+                <a:ea typeface="Arial"/>
+                <a:cs typeface="Arial"/>
+                <a:sym typeface="Arial"/>
+              </a:defRPr>
+            </a:lvl3pPr>
+            <a:lvl4pPr marR="0" lvl="3" algn="l" rtl="0">
+              <a:lnSpc>
+                <a:spcPct val="100000"/>
+              </a:lnSpc>
+              <a:spcBef>
+                <a:spcPts val="0"/>
+              </a:spcBef>
+              <a:spcAft>
+                <a:spcPts val="0"/>
+              </a:spcAft>
+              <a:buClr>
+                <a:srgbClr val="000000"/>
+              </a:buClr>
+              <a:buFont typeface="Arial"/>
+              <a:defRPr sz="1400" b="0" i="0" u="none" strike="noStrike" cap="none">
+                <a:solidFill>
+                  <a:srgbClr val="000000"/>
+                </a:solidFill>
+                <a:latin typeface="Arial"/>
+                <a:ea typeface="Arial"/>
+                <a:cs typeface="Arial"/>
+                <a:sym typeface="Arial"/>
+              </a:defRPr>
+            </a:lvl4pPr>
+            <a:lvl5pPr marR="0" lvl="4" algn="l" rtl="0">
+              <a:lnSpc>
+                <a:spcPct val="100000"/>
+              </a:lnSpc>
+              <a:spcBef>
+                <a:spcPts val="0"/>
+              </a:spcBef>
+              <a:spcAft>
+                <a:spcPts val="0"/>
+              </a:spcAft>
+              <a:buClr>
+                <a:srgbClr val="000000"/>
+              </a:buClr>
+              <a:buFont typeface="Arial"/>
+              <a:defRPr sz="1400" b="0" i="0" u="none" strike="noStrike" cap="none">
+                <a:solidFill>
+                  <a:srgbClr val="000000"/>
+                </a:solidFill>
+                <a:latin typeface="Arial"/>
+                <a:ea typeface="Arial"/>
+                <a:cs typeface="Arial"/>
+                <a:sym typeface="Arial"/>
+              </a:defRPr>
+            </a:lvl5pPr>
+            <a:lvl6pPr marR="0" lvl="5" algn="l" rtl="0">
+              <a:lnSpc>
+                <a:spcPct val="100000"/>
+              </a:lnSpc>
+              <a:spcBef>
+                <a:spcPts val="0"/>
+              </a:spcBef>
+              <a:spcAft>
+                <a:spcPts val="0"/>
+              </a:spcAft>
+              <a:buClr>
+                <a:srgbClr val="000000"/>
+              </a:buClr>
+              <a:buFont typeface="Arial"/>
+              <a:defRPr sz="1400" b="0" i="0" u="none" strike="noStrike" cap="none">
+                <a:solidFill>
+                  <a:srgbClr val="000000"/>
+                </a:solidFill>
+                <a:latin typeface="Arial"/>
+                <a:ea typeface="Arial"/>
+                <a:cs typeface="Arial"/>
+                <a:sym typeface="Arial"/>
+              </a:defRPr>
+            </a:lvl6pPr>
+            <a:lvl7pPr marR="0" lvl="6" algn="l" rtl="0">
+              <a:lnSpc>
+                <a:spcPct val="100000"/>
+              </a:lnSpc>
+              <a:spcBef>
+                <a:spcPts val="0"/>
+              </a:spcBef>
+              <a:spcAft>
+                <a:spcPts val="0"/>
+              </a:spcAft>
+              <a:buClr>
+                <a:srgbClr val="000000"/>
+              </a:buClr>
+              <a:buFont typeface="Arial"/>
+              <a:defRPr sz="1400" b="0" i="0" u="none" strike="noStrike" cap="none">
+                <a:solidFill>
+                  <a:srgbClr val="000000"/>
+                </a:solidFill>
+                <a:latin typeface="Arial"/>
+                <a:ea typeface="Arial"/>
+                <a:cs typeface="Arial"/>
+                <a:sym typeface="Arial"/>
+              </a:defRPr>
+            </a:lvl7pPr>
+            <a:lvl8pPr marR="0" lvl="7" algn="l" rtl="0">
+              <a:lnSpc>
+                <a:spcPct val="100000"/>
+              </a:lnSpc>
+              <a:spcBef>
+                <a:spcPts val="0"/>
+              </a:spcBef>
+              <a:spcAft>
+                <a:spcPts val="0"/>
+              </a:spcAft>
+              <a:buClr>
+                <a:srgbClr val="000000"/>
+              </a:buClr>
+              <a:buFont typeface="Arial"/>
+              <a:defRPr sz="1400" b="0" i="0" u="none" strike="noStrike" cap="none">
+                <a:solidFill>
+                  <a:srgbClr val="000000"/>
+                </a:solidFill>
+                <a:latin typeface="Arial"/>
+                <a:ea typeface="Arial"/>
+                <a:cs typeface="Arial"/>
+                <a:sym typeface="Arial"/>
+              </a:defRPr>
+            </a:lvl8pPr>
+            <a:lvl9pPr marR="0" lvl="8" algn="l" rtl="0">
+              <a:lnSpc>
+                <a:spcPct val="100000"/>
+              </a:lnSpc>
+              <a:spcBef>
+                <a:spcPts val="0"/>
+              </a:spcBef>
+              <a:spcAft>
+                <a:spcPts val="0"/>
+              </a:spcAft>
+              <a:buClr>
+                <a:srgbClr val="000000"/>
+              </a:buClr>
+              <a:buFont typeface="Arial"/>
+              <a:defRPr sz="1400" b="0" i="0" u="none" strike="noStrike" cap="none">
+                <a:solidFill>
+                  <a:srgbClr val="000000"/>
+                </a:solidFill>
+                <a:latin typeface="Arial"/>
+                <a:ea typeface="Arial"/>
+                <a:cs typeface="Arial"/>
+                <a:sym typeface="Arial"/>
+              </a:defRPr>
+            </a:lvl9pPr>
+          </a:lstStyle>
+          <a:p>
+            <a:r>
+              <a:rPr lang="en-GB" sz="1400" dirty="0">
+                <a:solidFill>
+                  <a:schemeClr val="dk1"/>
+                </a:solidFill>
+              </a:rPr>
+              <a:t>K8S access user</a:t>
+            </a:r>
+            <a:r>
+              <a:rPr lang="ru-RU" sz="1400" dirty="0">
+                <a:solidFill>
+                  <a:schemeClr val="dk1"/>
+                </a:solidFill>
+              </a:rPr>
+              <a:t>: </a:t>
+            </a:r>
+            <a:r>
+              <a:rPr lang="en-GB" sz="1400" dirty="0" err="1">
+                <a:solidFill>
+                  <a:schemeClr val="dk1"/>
+                </a:solidFill>
+              </a:rPr>
+              <a:t>Smolkin</a:t>
+            </a:r>
+            <a:r>
+              <a:rPr lang="en-GB" sz="1400" dirty="0">
+                <a:solidFill>
+                  <a:schemeClr val="dk1"/>
+                </a:solidFill>
+              </a:rPr>
+              <a:t> Mikhail</a:t>
+            </a:r>
+            <a:endParaRPr lang="ru-RU" dirty="0"/>
           </a:p>
         </p:txBody>
       </p:sp>

</xml_diff>